<commit_message>
Updated Presentations to match recent changes
</commit_message>
<xml_diff>
--- a/Ergasia.pptx
+++ b/Ergasia.pptx
@@ -7744,8 +7744,8 @@
         </p:blipFill>
         <p:spPr>
           <a:xfrm>
-            <a:off x="254250" y="2774250"/>
-            <a:ext cx="1828800" cy="514350"/>
+            <a:off x="2640238" y="3106850"/>
+            <a:ext cx="2619375" cy="695325"/>
           </a:xfrm>
           <a:prstGeom prst="rect">
             <a:avLst/>
@@ -7772,8 +7772,8 @@
         </p:blipFill>
         <p:spPr>
           <a:xfrm>
-            <a:off x="2640238" y="3106850"/>
-            <a:ext cx="2619375" cy="695325"/>
+            <a:off x="416175" y="2736500"/>
+            <a:ext cx="1504950" cy="723900"/>
           </a:xfrm>
           <a:prstGeom prst="rect">
             <a:avLst/>

</xml_diff>